<commit_message>
Some Changes in the presentation
</commit_message>
<xml_diff>
--- a/Earthquake_Predictor_Capstone_Presentation.pptx
+++ b/Earthquake_Predictor_Capstone_Presentation.pptx
@@ -8,15 +8,16 @@
     <p:sldId id="256" r:id="rId2"/>
     <p:sldId id="257" r:id="rId3"/>
     <p:sldId id="258" r:id="rId4"/>
-    <p:sldId id="259" r:id="rId5"/>
-    <p:sldId id="260" r:id="rId6"/>
-    <p:sldId id="261" r:id="rId7"/>
-    <p:sldId id="262" r:id="rId8"/>
-    <p:sldId id="263" r:id="rId9"/>
-    <p:sldId id="264" r:id="rId10"/>
-    <p:sldId id="265" r:id="rId11"/>
-    <p:sldId id="266" r:id="rId12"/>
-    <p:sldId id="267" r:id="rId13"/>
+    <p:sldId id="268" r:id="rId5"/>
+    <p:sldId id="259" r:id="rId6"/>
+    <p:sldId id="260" r:id="rId7"/>
+    <p:sldId id="261" r:id="rId8"/>
+    <p:sldId id="262" r:id="rId9"/>
+    <p:sldId id="263" r:id="rId10"/>
+    <p:sldId id="264" r:id="rId11"/>
+    <p:sldId id="265" r:id="rId12"/>
+    <p:sldId id="266" r:id="rId13"/>
+    <p:sldId id="267" r:id="rId14"/>
   </p:sldIdLst>
   <p:sldSz cx="9144000" cy="6858000" type="screen4x3"/>
   <p:notesSz cx="6858000" cy="9144000"/>
@@ -319,7 +320,7 @@
           <a:p>
             <a:fld id="{5BCAD085-E8A6-8845-BD4E-CB4CCA059FC4}" type="datetimeFigureOut">
               <a:rPr lang="en-US" smtClean="0"/>
-              <a:t>7/17/2025</a:t>
+              <a:t>7/18/2025</a:t>
             </a:fld>
             <a:endParaRPr lang="en-US"/>
           </a:p>
@@ -617,7 +618,7 @@
           <a:p>
             <a:fld id="{5BCAD085-E8A6-8845-BD4E-CB4CCA059FC4}" type="datetimeFigureOut">
               <a:rPr lang="en-US" smtClean="0"/>
-              <a:t>7/17/2025</a:t>
+              <a:t>7/18/2025</a:t>
             </a:fld>
             <a:endParaRPr lang="en-US"/>
           </a:p>
@@ -809,7 +810,7 @@
           <a:p>
             <a:fld id="{5BCAD085-E8A6-8845-BD4E-CB4CCA059FC4}" type="datetimeFigureOut">
               <a:rPr lang="en-US" smtClean="0"/>
-              <a:t>7/17/2025</a:t>
+              <a:t>7/18/2025</a:t>
             </a:fld>
             <a:endParaRPr lang="en-US"/>
           </a:p>
@@ -1070,7 +1071,7 @@
           <a:p>
             <a:fld id="{5BCAD085-E8A6-8845-BD4E-CB4CCA059FC4}" type="datetimeFigureOut">
               <a:rPr lang="en-US" smtClean="0"/>
-              <a:t>7/17/2025</a:t>
+              <a:t>7/18/2025</a:t>
             </a:fld>
             <a:endParaRPr lang="en-US"/>
           </a:p>
@@ -1494,7 +1495,7 @@
           <a:p>
             <a:fld id="{5BCAD085-E8A6-8845-BD4E-CB4CCA059FC4}" type="datetimeFigureOut">
               <a:rPr lang="en-US" smtClean="0"/>
-              <a:t>7/17/2025</a:t>
+              <a:t>7/18/2025</a:t>
             </a:fld>
             <a:endParaRPr lang="en-US"/>
           </a:p>
@@ -2031,7 +2032,7 @@
           <a:p>
             <a:fld id="{5BCAD085-E8A6-8845-BD4E-CB4CCA059FC4}" type="datetimeFigureOut">
               <a:rPr lang="en-US" smtClean="0"/>
-              <a:t>7/17/2025</a:t>
+              <a:t>7/18/2025</a:t>
             </a:fld>
             <a:endParaRPr lang="en-US"/>
           </a:p>
@@ -2895,7 +2896,7 @@
           <a:p>
             <a:fld id="{5BCAD085-E8A6-8845-BD4E-CB4CCA059FC4}" type="datetimeFigureOut">
               <a:rPr lang="en-US" smtClean="0"/>
-              <a:t>7/17/2025</a:t>
+              <a:t>7/18/2025</a:t>
             </a:fld>
             <a:endParaRPr lang="en-US"/>
           </a:p>
@@ -3065,7 +3066,7 @@
           <a:p>
             <a:fld id="{5BCAD085-E8A6-8845-BD4E-CB4CCA059FC4}" type="datetimeFigureOut">
               <a:rPr lang="en-US" smtClean="0"/>
-              <a:t>7/17/2025</a:t>
+              <a:t>7/18/2025</a:t>
             </a:fld>
             <a:endParaRPr lang="en-US"/>
           </a:p>
@@ -3249,7 +3250,7 @@
           <a:p>
             <a:fld id="{5BCAD085-E8A6-8845-BD4E-CB4CCA059FC4}" type="datetimeFigureOut">
               <a:rPr lang="en-US" smtClean="0"/>
-              <a:t>7/17/2025</a:t>
+              <a:t>7/18/2025</a:t>
             </a:fld>
             <a:endParaRPr lang="en-US"/>
           </a:p>
@@ -3419,7 +3420,7 @@
           <a:p>
             <a:fld id="{5BCAD085-E8A6-8845-BD4E-CB4CCA059FC4}" type="datetimeFigureOut">
               <a:rPr lang="en-US" smtClean="0"/>
-              <a:t>7/17/2025</a:t>
+              <a:t>7/18/2025</a:t>
             </a:fld>
             <a:endParaRPr lang="en-US"/>
           </a:p>
@@ -3663,7 +3664,7 @@
           <a:p>
             <a:fld id="{5BCAD085-E8A6-8845-BD4E-CB4CCA059FC4}" type="datetimeFigureOut">
               <a:rPr lang="en-US" smtClean="0"/>
-              <a:t>7/17/2025</a:t>
+              <a:t>7/18/2025</a:t>
             </a:fld>
             <a:endParaRPr lang="en-US"/>
           </a:p>
@@ -3899,7 +3900,7 @@
           <a:p>
             <a:fld id="{5BCAD085-E8A6-8845-BD4E-CB4CCA059FC4}" type="datetimeFigureOut">
               <a:rPr lang="en-US" smtClean="0"/>
-              <a:t>7/17/2025</a:t>
+              <a:t>7/18/2025</a:t>
             </a:fld>
             <a:endParaRPr lang="en-US"/>
           </a:p>
@@ -4365,7 +4366,7 @@
           <a:p>
             <a:fld id="{5BCAD085-E8A6-8845-BD4E-CB4CCA059FC4}" type="datetimeFigureOut">
               <a:rPr lang="en-US" smtClean="0"/>
-              <a:t>7/17/2025</a:t>
+              <a:t>7/18/2025</a:t>
             </a:fld>
             <a:endParaRPr lang="en-US"/>
           </a:p>
@@ -4483,7 +4484,7 @@
           <a:p>
             <a:fld id="{5BCAD085-E8A6-8845-BD4E-CB4CCA059FC4}" type="datetimeFigureOut">
               <a:rPr lang="en-US" smtClean="0"/>
-              <a:t>7/17/2025</a:t>
+              <a:t>7/18/2025</a:t>
             </a:fld>
             <a:endParaRPr lang="en-US"/>
           </a:p>
@@ -4578,7 +4579,7 @@
           <a:p>
             <a:fld id="{5BCAD085-E8A6-8845-BD4E-CB4CCA059FC4}" type="datetimeFigureOut">
               <a:rPr lang="en-US" smtClean="0"/>
-              <a:t>7/17/2025</a:t>
+              <a:t>7/18/2025</a:t>
             </a:fld>
             <a:endParaRPr lang="en-US"/>
           </a:p>
@@ -4833,7 +4834,7 @@
           <a:p>
             <a:fld id="{5BCAD085-E8A6-8845-BD4E-CB4CCA059FC4}" type="datetimeFigureOut">
               <a:rPr lang="en-US" smtClean="0"/>
-              <a:t>7/17/2025</a:t>
+              <a:t>7/18/2025</a:t>
             </a:fld>
             <a:endParaRPr lang="en-US"/>
           </a:p>
@@ -5133,7 +5134,7 @@
           <a:p>
             <a:fld id="{5BCAD085-E8A6-8845-BD4E-CB4CCA059FC4}" type="datetimeFigureOut">
               <a:rPr lang="en-US" smtClean="0"/>
-              <a:t>7/17/2025</a:t>
+              <a:t>7/18/2025</a:t>
             </a:fld>
             <a:endParaRPr lang="en-US"/>
           </a:p>
@@ -5367,7 +5368,7 @@
           <a:p>
             <a:fld id="{5BCAD085-E8A6-8845-BD4E-CB4CCA059FC4}" type="datetimeFigureOut">
               <a:rPr lang="en-US" smtClean="0"/>
-              <a:t>7/17/2025</a:t>
+              <a:t>7/18/2025</a:t>
             </a:fld>
             <a:endParaRPr lang="en-US"/>
           </a:p>
@@ -6136,7 +6137,7 @@
           <a:lstStyle/>
           <a:p>
             <a:r>
-              <a:t>Future Improvements</a:t>
+              <a:t>Challenges &amp; Solutions</a:t>
             </a:r>
           </a:p>
         </p:txBody>
@@ -6157,27 +6158,38 @@
           <a:lstStyle/>
           <a:p>
             <a:r>
-              <a:t>- Add support for IoT edge devices</a:t>
-            </a:r>
-          </a:p>
-          <a:p>
-            <a:r>
-              <a:t>- Improve AI model accuracy and generalization</a:t>
-            </a:r>
-          </a:p>
-          <a:p>
-            <a:r>
-              <a:t>- Add historical visualization tools</a:t>
-            </a:r>
-          </a:p>
-          <a:p>
-            <a:r>
-              <a:t>- Enhance dashboard UI with alert maps</a:t>
-            </a:r>
-          </a:p>
-          <a:p>
-            <a:r>
-              <a:t>- Implement mobile app interface</a:t>
+              <a:t>- Challenge: Handling real-time data</a:t>
+            </a:r>
+          </a:p>
+          <a:p>
+            <a:r>
+              <a:t>  Solution: Efficient polling and caching in backend</a:t>
+            </a:r>
+          </a:p>
+          <a:p>
+            <a:endParaRPr/>
+          </a:p>
+          <a:p>
+            <a:r>
+              <a:t>- Challenge: AI prediction performance</a:t>
+            </a:r>
+          </a:p>
+          <a:p>
+            <a:r>
+              <a:t>  Solution: Optimization and async processing</a:t>
+            </a:r>
+          </a:p>
+          <a:p>
+            <a:endParaRPr/>
+          </a:p>
+          <a:p>
+            <a:r>
+              <a:t>- Challenge: Infrastructure scaling</a:t>
+            </a:r>
+          </a:p>
+          <a:p>
+            <a:r>
+              <a:t>  Solution: AWS Auto Scaling and Load Balancer setup</a:t>
             </a:r>
           </a:p>
         </p:txBody>
@@ -6223,7 +6235,7 @@
           <a:lstStyle/>
           <a:p>
             <a:r>
-              <a:t>Conclusion</a:t>
+              <a:t>Future Improvements</a:t>
             </a:r>
           </a:p>
         </p:txBody>
@@ -6240,51 +6252,31 @@
         </p:nvSpPr>
         <p:spPr/>
         <p:txBody>
-          <a:bodyPr>
-            <a:normAutofit lnSpcReduction="10000"/>
-          </a:bodyPr>
-          <a:lstStyle/>
-          <a:p>
-            <a:r>
-              <a:t>This project showcases an end-to-end system for predicting and monitoring earthquakes using:</a:t>
-            </a:r>
-          </a:p>
-          <a:p>
-            <a:r>
-              <a:t>- Public seismic data</a:t>
-            </a:r>
-          </a:p>
-          <a:p>
-            <a:r>
-              <a:t>- AI/ML modeling</a:t>
-            </a:r>
-          </a:p>
-          <a:p>
-            <a:r>
-              <a:t>- AWS scalable infrastructure</a:t>
-            </a:r>
-          </a:p>
-          <a:p>
-            <a:r>
-              <a:t>- Node-RED visualization</a:t>
-            </a:r>
-          </a:p>
-          <a:p>
-            <a:endParaRPr/>
-          </a:p>
-          <a:p>
-            <a:r>
-              <a:t>Impact:</a:t>
-            </a:r>
-          </a:p>
-          <a:p>
-            <a:r>
-              <a:t>- Early warnings can save lives and reduce damage</a:t>
-            </a:r>
-          </a:p>
-          <a:p>
-            <a:r>
-              <a:t>- Demonstrates effective use of cloud + AI</a:t>
+          <a:bodyPr/>
+          <a:lstStyle/>
+          <a:p>
+            <a:r>
+              <a:t>- Add support for IoT edge devices</a:t>
+            </a:r>
+          </a:p>
+          <a:p>
+            <a:r>
+              <a:t>- Improve AI model accuracy and generalization</a:t>
+            </a:r>
+          </a:p>
+          <a:p>
+            <a:r>
+              <a:t>- Add historical visualization tools</a:t>
+            </a:r>
+          </a:p>
+          <a:p>
+            <a:r>
+              <a:t>- Enhance dashboard UI with alert maps</a:t>
+            </a:r>
+          </a:p>
+          <a:p>
+            <a:r>
+              <a:t>- Implement mobile app interface</a:t>
             </a:r>
           </a:p>
         </p:txBody>
@@ -6330,6 +6322,113 @@
           <a:lstStyle/>
           <a:p>
             <a:r>
+              <a:t>Conclusion</a:t>
+            </a:r>
+          </a:p>
+        </p:txBody>
+      </p:sp>
+      <p:sp>
+        <p:nvSpPr>
+          <p:cNvPr id="3" name="Content Placeholder 2"/>
+          <p:cNvSpPr>
+            <a:spLocks noGrp="1"/>
+          </p:cNvSpPr>
+          <p:nvPr>
+            <p:ph idx="1"/>
+          </p:nvPr>
+        </p:nvSpPr>
+        <p:spPr/>
+        <p:txBody>
+          <a:bodyPr>
+            <a:normAutofit lnSpcReduction="10000"/>
+          </a:bodyPr>
+          <a:lstStyle/>
+          <a:p>
+            <a:r>
+              <a:t>This project showcases an end-to-end system for predicting and monitoring earthquakes using:</a:t>
+            </a:r>
+          </a:p>
+          <a:p>
+            <a:r>
+              <a:t>- Public seismic data</a:t>
+            </a:r>
+          </a:p>
+          <a:p>
+            <a:r>
+              <a:t>- AI/ML modeling</a:t>
+            </a:r>
+          </a:p>
+          <a:p>
+            <a:r>
+              <a:t>- AWS scalable infrastructure</a:t>
+            </a:r>
+          </a:p>
+          <a:p>
+            <a:r>
+              <a:t>- Node-RED visualization</a:t>
+            </a:r>
+          </a:p>
+          <a:p>
+            <a:endParaRPr/>
+          </a:p>
+          <a:p>
+            <a:r>
+              <a:t>Impact:</a:t>
+            </a:r>
+          </a:p>
+          <a:p>
+            <a:r>
+              <a:t>- Early warnings can save lives and reduce damage</a:t>
+            </a:r>
+          </a:p>
+          <a:p>
+            <a:r>
+              <a:t>- Demonstrates effective use of cloud + AI</a:t>
+            </a:r>
+          </a:p>
+        </p:txBody>
+      </p:sp>
+    </p:spTree>
+  </p:cSld>
+  <p:clrMapOvr>
+    <a:masterClrMapping/>
+  </p:clrMapOvr>
+</p:sld>
+</file>
+
+<file path=ppt/slides/slide13.xml><?xml version="1.0" encoding="utf-8"?>
+<p:sld xmlns:a="http://schemas.openxmlformats.org/drawingml/2006/main" xmlns:r="http://schemas.openxmlformats.org/officeDocument/2006/relationships" xmlns:p="http://schemas.openxmlformats.org/presentationml/2006/main">
+  <p:cSld>
+    <p:spTree>
+      <p:nvGrpSpPr>
+        <p:cNvPr id="1" name=""/>
+        <p:cNvGrpSpPr/>
+        <p:nvPr/>
+      </p:nvGrpSpPr>
+      <p:grpSpPr>
+        <a:xfrm>
+          <a:off x="0" y="0"/>
+          <a:ext cx="0" cy="0"/>
+          <a:chOff x="0" y="0"/>
+          <a:chExt cx="0" cy="0"/>
+        </a:xfrm>
+      </p:grpSpPr>
+      <p:sp>
+        <p:nvSpPr>
+          <p:cNvPr id="2" name="Title 1"/>
+          <p:cNvSpPr>
+            <a:spLocks noGrp="1"/>
+          </p:cNvSpPr>
+          <p:nvPr>
+            <p:ph type="title"/>
+          </p:nvPr>
+        </p:nvSpPr>
+        <p:spPr/>
+        <p:txBody>
+          <a:bodyPr/>
+          <a:lstStyle/>
+          <a:p>
+            <a:r>
               <a:t>Thank You</a:t>
             </a:r>
           </a:p>
@@ -6427,7 +6526,7 @@
           <a:p>
             <a:r>
               <a:rPr dirty="0"/>
-              <a:t>The Earthquake Predictor project aims to use publicly available seismic data combined with AI to forecast potential earthquake events.</a:t>
+              <a:t>The Earthquake Predictor aims to use publicly available seismic data combined with AI to forecast potential earthquake events.</a:t>
             </a:r>
           </a:p>
           <a:p>
@@ -6528,59 +6627,54 @@
           <a:p>
             <a:r>
               <a:rPr dirty="0"/>
-              <a:t>1. Public Earthquake Data Source (e.g., USGS)</a:t>
+              <a:t>Python Backend with AI model for prediction</a:t>
             </a:r>
           </a:p>
           <a:p>
             <a:r>
               <a:rPr dirty="0"/>
-              <a:t>2. Python Backend with AI model for prediction</a:t>
-            </a:r>
-          </a:p>
-          <a:p>
-            <a:r>
-              <a:rPr dirty="0"/>
-              <a:t>3. Node-RED Dashboard for visualization</a:t>
-            </a:r>
-          </a:p>
-          <a:p>
-            <a:r>
-              <a:rPr dirty="0"/>
-              <a:t>4. AWS Infrastructure:</a:t>
+              <a:t>Node-RED Dashboard for visualization</a:t>
+            </a:r>
+            <a:endParaRPr lang="de-DE" dirty="0"/>
+          </a:p>
+          <a:p>
+            <a:r>
+              <a:rPr lang="en-US" dirty="0"/>
+              <a:t>AWS Infrastructure:</a:t>
             </a:r>
           </a:p>
           <a:p>
             <a:pPr lvl="1"/>
             <a:r>
-              <a:rPr dirty="0"/>
+              <a:rPr lang="en-US" dirty="0"/>
               <a:t>  EC2 Instances for frontend/backend</a:t>
             </a:r>
           </a:p>
           <a:p>
             <a:pPr lvl="1"/>
             <a:r>
-              <a:rPr dirty="0"/>
+              <a:rPr lang="en-US" dirty="0"/>
               <a:t>  RDS for relational data storage</a:t>
             </a:r>
           </a:p>
           <a:p>
             <a:pPr lvl="1"/>
             <a:r>
-              <a:rPr dirty="0"/>
+              <a:rPr lang="en-US" dirty="0"/>
               <a:t>  Application Load Balancer</a:t>
             </a:r>
           </a:p>
           <a:p>
             <a:pPr lvl="1"/>
             <a:r>
-              <a:rPr dirty="0"/>
+              <a:rPr lang="en-US" dirty="0"/>
               <a:t>  Auto Scaling Group</a:t>
             </a:r>
           </a:p>
           <a:p>
             <a:pPr lvl="1"/>
             <a:r>
-              <a:rPr dirty="0"/>
+              <a:rPr lang="en-US" dirty="0"/>
               <a:t>  Networking: VPC, IGW, Security Groups</a:t>
             </a:r>
           </a:p>
@@ -6613,7 +6707,13 @@
       </p:grpSpPr>
       <p:sp>
         <p:nvSpPr>
-          <p:cNvPr id="2" name="Title 1"/>
+          <p:cNvPr id="2" name="Titel 1">
+            <a:extLst>
+              <a:ext uri="{FF2B5EF4-FFF2-40B4-BE49-F238E27FC236}">
+                <a16:creationId xmlns:a16="http://schemas.microsoft.com/office/drawing/2014/main" id="{D998D9C4-5542-FD9B-AC1B-8E21A136656B}"/>
+              </a:ext>
+            </a:extLst>
+          </p:cNvPr>
           <p:cNvSpPr>
             <a:spLocks noGrp="1"/>
           </p:cNvSpPr>
@@ -6626,64 +6726,51 @@
           <a:bodyPr/>
           <a:lstStyle/>
           <a:p>
-            <a:r>
-              <a:t>Technology Stack</a:t>
-            </a:r>
-          </a:p>
-        </p:txBody>
-      </p:sp>
-      <p:sp>
-        <p:nvSpPr>
-          <p:cNvPr id="3" name="Content Placeholder 2"/>
-          <p:cNvSpPr>
-            <a:spLocks noGrp="1"/>
-          </p:cNvSpPr>
+            <a:endParaRPr lang="de-DE"/>
+          </a:p>
+        </p:txBody>
+      </p:sp>
+      <p:pic>
+        <p:nvPicPr>
+          <p:cNvPr id="5" name="Inhaltsplatzhalter 4">
+            <a:extLst>
+              <a:ext uri="{FF2B5EF4-FFF2-40B4-BE49-F238E27FC236}">
+                <a16:creationId xmlns:a16="http://schemas.microsoft.com/office/drawing/2014/main" id="{DCDCB9F2-7190-A699-E10E-BDEB663AFEA7}"/>
+              </a:ext>
+            </a:extLst>
+          </p:cNvPr>
+          <p:cNvPicPr>
+            <a:picLocks noGrp="1" noChangeAspect="1"/>
+          </p:cNvPicPr>
           <p:nvPr>
             <p:ph idx="1"/>
           </p:nvPr>
-        </p:nvSpPr>
-        <p:spPr/>
-        <p:txBody>
-          <a:bodyPr/>
-          <a:lstStyle/>
-          <a:p>
-            <a:r>
-              <a:t>- Node-RED for UI and data flow orchestration</a:t>
-            </a:r>
-          </a:p>
-          <a:p>
-            <a:r>
-              <a:t>- Python (AI Model: potentially LSTM or regression-based)</a:t>
-            </a:r>
-          </a:p>
-          <a:p>
-            <a:r>
-              <a:t>- AWS EC2 for compute instances</a:t>
-            </a:r>
-          </a:p>
-          <a:p>
-            <a:r>
-              <a:t>- AWS RDS (PostgreSQL/MySQL) for database</a:t>
-            </a:r>
-          </a:p>
-          <a:p>
-            <a:r>
-              <a:t>- AWS Application Load Balancer (ALB)</a:t>
-            </a:r>
-          </a:p>
-          <a:p>
-            <a:r>
-              <a:t>- AWS Auto Scaling</a:t>
-            </a:r>
-          </a:p>
-          <a:p>
-            <a:r>
-              <a:t>- Networking: VPC, IGW, Security Groups</a:t>
-            </a:r>
-          </a:p>
-        </p:txBody>
-      </p:sp>
+        </p:nvPicPr>
+        <p:blipFill>
+          <a:blip r:embed="rId2">
+            <a:extLst>
+              <a:ext uri="{96DAC541-7B7A-43D3-8B79-37D633B846F1}">
+                <asvg:svgBlip xmlns:asvg="http://schemas.microsoft.com/office/drawing/2016/SVG/main" r:embed="rId3"/>
+              </a:ext>
+            </a:extLst>
+          </a:blip>
+          <a:stretch>
+            <a:fillRect/>
+          </a:stretch>
+        </p:blipFill>
+        <p:spPr>
+          <a:xfrm>
+            <a:off x="2592371" y="-19933"/>
+            <a:ext cx="4392891" cy="6872237"/>
+          </a:xfrm>
+        </p:spPr>
+      </p:pic>
     </p:spTree>
+    <p:extLst>
+      <p:ext uri="{BB962C8B-B14F-4D97-AF65-F5344CB8AC3E}">
+        <p14:creationId xmlns:p14="http://schemas.microsoft.com/office/powerpoint/2010/main" val="3129199928"/>
+      </p:ext>
+    </p:extLst>
   </p:cSld>
   <p:clrMapOvr>
     <a:masterClrMapping/>
@@ -6724,7 +6811,7 @@
           <a:lstStyle/>
           <a:p>
             <a:r>
-              <a:t>AI-Based Prediction</a:t>
+              <a:t>Technology Stack</a:t>
             </a:r>
           </a:p>
         </p:txBody>
@@ -6741,65 +6828,41 @@
         </p:nvSpPr>
         <p:spPr/>
         <p:txBody>
-          <a:bodyPr>
-            <a:normAutofit fontScale="92500" lnSpcReduction="20000"/>
-          </a:bodyPr>
-          <a:lstStyle/>
-          <a:p>
-            <a:r>
-              <a:rPr dirty="0"/>
-              <a:t>The backend Python service uses an AI model to analyze historical seismic data.</a:t>
-            </a:r>
-          </a:p>
-          <a:p>
-            <a:r>
-              <a:rPr dirty="0"/>
-              <a:t>Approach:</a:t>
-            </a:r>
-          </a:p>
-          <a:p>
-            <a:r>
-              <a:rPr dirty="0"/>
-              <a:t>- Clean and process data</a:t>
-            </a:r>
-          </a:p>
-          <a:p>
-            <a:r>
-              <a:rPr dirty="0"/>
-              <a:t>- Use AI to detect patterns</a:t>
-            </a:r>
-          </a:p>
-          <a:p>
-            <a:r>
-              <a:rPr dirty="0"/>
-              <a:t>- Forecast future seismic activity</a:t>
-            </a:r>
-          </a:p>
-          <a:p>
-            <a:endParaRPr dirty="0"/>
-          </a:p>
-          <a:p>
-            <a:r>
-              <a:rPr dirty="0"/>
-              <a:t>Advantages:</a:t>
-            </a:r>
-          </a:p>
-          <a:p>
-            <a:r>
-              <a:rPr dirty="0"/>
-              <a:t>- More accurate short-term forecasting</a:t>
-            </a:r>
-          </a:p>
-          <a:p>
-            <a:r>
-              <a:rPr dirty="0"/>
-              <a:t>- Can be trained on any regional data</a:t>
-            </a:r>
-          </a:p>
-          <a:p>
-            <a:r>
-              <a:rPr dirty="0"/>
-              <a:t>- Easily updatable model</a:t>
+          <a:bodyPr/>
+          <a:lstStyle/>
+          <a:p>
+            <a:r>
+              <a:t>- Node-RED for UI and data flow orchestration</a:t>
+            </a:r>
+          </a:p>
+          <a:p>
+            <a:r>
+              <a:t>- Python (AI Model: potentially LSTM or regression-based)</a:t>
+            </a:r>
+          </a:p>
+          <a:p>
+            <a:r>
+              <a:t>- AWS EC2 for compute instances</a:t>
+            </a:r>
+          </a:p>
+          <a:p>
+            <a:r>
+              <a:t>- AWS RDS (PostgreSQL/MySQL) for database</a:t>
+            </a:r>
+          </a:p>
+          <a:p>
+            <a:r>
+              <a:t>- AWS Application Load Balancer (ALB)</a:t>
+            </a:r>
+          </a:p>
+          <a:p>
+            <a:r>
+              <a:t>- AWS Auto Scaling</a:t>
+            </a:r>
+          </a:p>
+          <a:p>
+            <a:r>
+              <a:t>- Networking: VPC, IGW, Security Groups</a:t>
             </a:r>
           </a:p>
         </p:txBody>
@@ -6845,7 +6908,7 @@
           <a:lstStyle/>
           <a:p>
             <a:r>
-              <a:t>Node-RED Dashboard</a:t>
+              <a:t>AI-Based Prediction</a:t>
             </a:r>
           </a:p>
         </p:txBody>
@@ -6863,58 +6926,64 @@
         <p:spPr/>
         <p:txBody>
           <a:bodyPr>
-            <a:normAutofit fontScale="85000" lnSpcReduction="20000"/>
+            <a:normAutofit fontScale="92500" lnSpcReduction="20000"/>
           </a:bodyPr>
           <a:lstStyle/>
           <a:p>
             <a:r>
-              <a:t>The Node-RED interface serves as a live dashboard for monitoring predictions and seismic activity.</a:t>
-            </a:r>
-          </a:p>
-          <a:p>
-            <a:endParaRPr/>
-          </a:p>
-          <a:p>
-            <a:r>
-              <a:t>Features:</a:t>
-            </a:r>
-          </a:p>
-          <a:p>
-            <a:r>
-              <a:t>- Real-time data charts</a:t>
-            </a:r>
-          </a:p>
-          <a:p>
-            <a:r>
-              <a:t>- AI prediction output</a:t>
-            </a:r>
-          </a:p>
-          <a:p>
-            <a:r>
-              <a:t>- Alerts and notifications</a:t>
-            </a:r>
-          </a:p>
-          <a:p>
-            <a:endParaRPr/>
-          </a:p>
-          <a:p>
-            <a:r>
-              <a:t>Benefits:</a:t>
-            </a:r>
-          </a:p>
-          <a:p>
-            <a:r>
-              <a:t>- Easy-to-use UI</a:t>
-            </a:r>
-          </a:p>
-          <a:p>
-            <a:r>
-              <a:t>- Flexible flow programming</a:t>
-            </a:r>
-          </a:p>
-          <a:p>
-            <a:r>
-              <a:t>- Quick updates and deployment</a:t>
+              <a:rPr dirty="0"/>
+              <a:t>The backend Python service uses an AI model to analyze historical seismic data.</a:t>
+            </a:r>
+          </a:p>
+          <a:p>
+            <a:r>
+              <a:rPr dirty="0"/>
+              <a:t>Approach:</a:t>
+            </a:r>
+          </a:p>
+          <a:p>
+            <a:r>
+              <a:rPr dirty="0"/>
+              <a:t>- Clean and process data</a:t>
+            </a:r>
+          </a:p>
+          <a:p>
+            <a:r>
+              <a:rPr dirty="0"/>
+              <a:t>- Use AI to detect patterns</a:t>
+            </a:r>
+          </a:p>
+          <a:p>
+            <a:r>
+              <a:rPr dirty="0"/>
+              <a:t>- Forecast future seismic activity</a:t>
+            </a:r>
+          </a:p>
+          <a:p>
+            <a:endParaRPr dirty="0"/>
+          </a:p>
+          <a:p>
+            <a:r>
+              <a:rPr dirty="0"/>
+              <a:t>Advantages:</a:t>
+            </a:r>
+          </a:p>
+          <a:p>
+            <a:r>
+              <a:rPr dirty="0"/>
+              <a:t>- More accurate short-term forecasting</a:t>
+            </a:r>
+          </a:p>
+          <a:p>
+            <a:r>
+              <a:rPr dirty="0"/>
+              <a:t>- Can be trained on any regional data</a:t>
+            </a:r>
+          </a:p>
+          <a:p>
+            <a:r>
+              <a:rPr dirty="0"/>
+              <a:t>- Easily updatable model</a:t>
             </a:r>
           </a:p>
         </p:txBody>
@@ -6960,7 +7029,7 @@
           <a:lstStyle/>
           <a:p>
             <a:r>
-              <a:t>AWS Infrastructure</a:t>
+              <a:t>Node-RED Dashboard</a:t>
             </a:r>
           </a:p>
         </p:txBody>
@@ -6977,31 +7046,59 @@
         </p:nvSpPr>
         <p:spPr/>
         <p:txBody>
-          <a:bodyPr/>
-          <a:lstStyle/>
-          <a:p>
-            <a:r>
-              <a:t>- EC2 Instances: Backend (Python AI), Frontend (Node-RED)</a:t>
-            </a:r>
-          </a:p>
-          <a:p>
-            <a:r>
-              <a:t>- RDS: Stores processed and raw earthquake data</a:t>
-            </a:r>
-          </a:p>
-          <a:p>
-            <a:r>
-              <a:t>- ALB: Balances traffic to backend services</a:t>
-            </a:r>
-          </a:p>
-          <a:p>
-            <a:r>
-              <a:t>- Auto Scaling: Adjusts instance count based on load</a:t>
-            </a:r>
-          </a:p>
-          <a:p>
-            <a:r>
-              <a:t>- Networking: Secure architecture using VPC, IGW, Subnets, SG</a:t>
+          <a:bodyPr>
+            <a:normAutofit fontScale="85000" lnSpcReduction="20000"/>
+          </a:bodyPr>
+          <a:lstStyle/>
+          <a:p>
+            <a:r>
+              <a:t>The Node-RED interface serves as a live dashboard for monitoring predictions and seismic activity.</a:t>
+            </a:r>
+          </a:p>
+          <a:p>
+            <a:endParaRPr/>
+          </a:p>
+          <a:p>
+            <a:r>
+              <a:t>Features:</a:t>
+            </a:r>
+          </a:p>
+          <a:p>
+            <a:r>
+              <a:t>- Real-time data charts</a:t>
+            </a:r>
+          </a:p>
+          <a:p>
+            <a:r>
+              <a:t>- AI prediction output</a:t>
+            </a:r>
+          </a:p>
+          <a:p>
+            <a:r>
+              <a:t>- Alerts and notifications</a:t>
+            </a:r>
+          </a:p>
+          <a:p>
+            <a:endParaRPr/>
+          </a:p>
+          <a:p>
+            <a:r>
+              <a:t>Benefits:</a:t>
+            </a:r>
+          </a:p>
+          <a:p>
+            <a:r>
+              <a:t>- Easy-to-use UI</a:t>
+            </a:r>
+          </a:p>
+          <a:p>
+            <a:r>
+              <a:t>- Flexible flow programming</a:t>
+            </a:r>
+          </a:p>
+          <a:p>
+            <a:r>
+              <a:t>- Quick updates and deployment</a:t>
             </a:r>
           </a:p>
         </p:txBody>
@@ -7047,7 +7144,7 @@
           <a:lstStyle/>
           <a:p>
             <a:r>
-              <a:t>AWS Cost Estimation (Monthly)</a:t>
+              <a:t>AWS Infrastructure</a:t>
             </a:r>
           </a:p>
         </p:txBody>
@@ -7068,39 +7165,27 @@
           <a:lstStyle/>
           <a:p>
             <a:r>
-              <a:rPr dirty="0"/>
-              <a:t>- EC2 (2 t3.medium instances, 24/7): ~$50</a:t>
-            </a:r>
-          </a:p>
-          <a:p>
-            <a:r>
-              <a:rPr dirty="0"/>
-              <a:t>- RDS (db.t3.micro, 20GB storage): ~$15</a:t>
-            </a:r>
-          </a:p>
-          <a:p>
-            <a:r>
-              <a:rPr dirty="0"/>
-              <a:t>- ALB (100 GB data + 1M LCUs): ~$20</a:t>
-            </a:r>
-            <a:endParaRPr lang="de-DE" dirty="0"/>
-          </a:p>
-          <a:p>
-            <a:r>
-              <a:rPr dirty="0"/>
-              <a:t>**Estimated Monthly Cost: ~$95**</a:t>
-            </a:r>
-          </a:p>
-          <a:p>
-            <a:endParaRPr dirty="0"/>
-          </a:p>
-          <a:p>
-            <a:r>
-              <a:t>*Actual </a:t>
-            </a:r>
-            <a:r>
-              <a:rPr dirty="0"/>
-              <a:t>costs may vary.*</a:t>
+              <a:t>- EC2 Instances: Backend (Python AI), Frontend (Node-RED)</a:t>
+            </a:r>
+          </a:p>
+          <a:p>
+            <a:r>
+              <a:t>- RDS: Stores processed and raw earthquake data</a:t>
+            </a:r>
+          </a:p>
+          <a:p>
+            <a:r>
+              <a:t>- ALB: Balances traffic to backend services</a:t>
+            </a:r>
+          </a:p>
+          <a:p>
+            <a:r>
+              <a:t>- Auto Scaling: Adjusts instance count based on load</a:t>
+            </a:r>
+          </a:p>
+          <a:p>
+            <a:r>
+              <a:t>- Networking: Secure architecture using VPC, IGW, Subnets, SG</a:t>
             </a:r>
           </a:p>
         </p:txBody>
@@ -7146,7 +7231,7 @@
           <a:lstStyle/>
           <a:p>
             <a:r>
-              <a:t>Challenges &amp; Solutions</a:t>
+              <a:t>AWS Cost Estimation (Monthly)</a:t>
             </a:r>
           </a:p>
         </p:txBody>
@@ -7167,38 +7252,39 @@
           <a:lstStyle/>
           <a:p>
             <a:r>
-              <a:t>- Challenge: Handling real-time data</a:t>
-            </a:r>
-          </a:p>
-          <a:p>
-            <a:r>
-              <a:t>  Solution: Efficient polling and caching in backend</a:t>
-            </a:r>
-          </a:p>
-          <a:p>
-            <a:endParaRPr/>
-          </a:p>
-          <a:p>
-            <a:r>
-              <a:t>- Challenge: AI prediction performance</a:t>
-            </a:r>
-          </a:p>
-          <a:p>
-            <a:r>
-              <a:t>  Solution: Optimization and async processing</a:t>
-            </a:r>
-          </a:p>
-          <a:p>
-            <a:endParaRPr/>
-          </a:p>
-          <a:p>
-            <a:r>
-              <a:t>- Challenge: Infrastructure scaling</a:t>
-            </a:r>
-          </a:p>
-          <a:p>
-            <a:r>
-              <a:t>  Solution: AWS Auto Scaling and Load Balancer setup</a:t>
+              <a:rPr dirty="0"/>
+              <a:t>- EC2 (2 t3.medium instances, 24/7): ~$50</a:t>
+            </a:r>
+          </a:p>
+          <a:p>
+            <a:r>
+              <a:rPr dirty="0"/>
+              <a:t>- RDS (db.t3.micro, 20GB storage): ~$15</a:t>
+            </a:r>
+          </a:p>
+          <a:p>
+            <a:r>
+              <a:rPr dirty="0"/>
+              <a:t>- ALB (100 GB data + 1M LCUs): ~$20</a:t>
+            </a:r>
+            <a:endParaRPr lang="de-DE" dirty="0"/>
+          </a:p>
+          <a:p>
+            <a:r>
+              <a:rPr dirty="0"/>
+              <a:t>**Estimated Monthly Cost: ~$95**</a:t>
+            </a:r>
+          </a:p>
+          <a:p>
+            <a:endParaRPr dirty="0"/>
+          </a:p>
+          <a:p>
+            <a:r>
+              <a:t>*Actual </a:t>
+            </a:r>
+            <a:r>
+              <a:rPr dirty="0"/>
+              <a:t>costs may vary.*</a:t>
             </a:r>
           </a:p>
         </p:txBody>

</xml_diff>